<commit_message>
Finishing PPTX for Alpha
</commit_message>
<xml_diff>
--- a/PPT/Alpha Review.pptx
+++ b/PPT/Alpha Review.pptx
@@ -12,8 +12,9 @@
     <p:sldId id="282" r:id="rId6"/>
     <p:sldId id="286" r:id="rId7"/>
     <p:sldId id="283" r:id="rId8"/>
-    <p:sldId id="284" r:id="rId9"/>
-    <p:sldId id="285" r:id="rId10"/>
+    <p:sldId id="287" r:id="rId9"/>
+    <p:sldId id="284" r:id="rId10"/>
+    <p:sldId id="285" r:id="rId11"/>
   </p:sldIdLst>
   <p:sldSz cx="12192000" cy="6858000"/>
   <p:notesSz cx="6858000" cy="9144000"/>
@@ -13205,6 +13206,154 @@
       </p:grpSpPr>
       <p:sp>
         <p:nvSpPr>
+          <p:cNvPr id="4" name="Title 3">
+            <a:extLst>
+              <a:ext uri="{FF2B5EF4-FFF2-40B4-BE49-F238E27FC236}">
+                <a16:creationId xmlns:a16="http://schemas.microsoft.com/office/drawing/2014/main" id="{59CB7A9B-1706-7F9E-30AB-644E8D824D12}"/>
+              </a:ext>
+            </a:extLst>
+          </p:cNvPr>
+          <p:cNvSpPr>
+            <a:spLocks noGrp="1"/>
+          </p:cNvSpPr>
+          <p:nvPr>
+            <p:ph type="title"/>
+          </p:nvPr>
+        </p:nvSpPr>
+        <p:spPr/>
+        <p:txBody>
+          <a:bodyPr/>
+          <a:lstStyle/>
+          <a:p>
+            <a:r>
+              <a:rPr lang="en-US" dirty="0"/>
+              <a:t>UCF Cybersecurity Phishing Training</a:t>
+            </a:r>
+          </a:p>
+        </p:txBody>
+      </p:sp>
+      <p:pic>
+        <p:nvPicPr>
+          <p:cNvPr id="7" name="Picture 6" descr="Graphical user interface, text, application&#10;&#10;Description automatically generated">
+            <a:extLst>
+              <a:ext uri="{FF2B5EF4-FFF2-40B4-BE49-F238E27FC236}">
+                <a16:creationId xmlns:a16="http://schemas.microsoft.com/office/drawing/2014/main" id="{20546C2C-D9A0-8AA1-D048-9421E45DE7A8}"/>
+              </a:ext>
+            </a:extLst>
+          </p:cNvPr>
+          <p:cNvPicPr>
+            <a:picLocks noChangeAspect="1"/>
+          </p:cNvPicPr>
+          <p:nvPr/>
+        </p:nvPicPr>
+        <p:blipFill>
+          <a:blip r:embed="rId2"/>
+          <a:stretch>
+            <a:fillRect/>
+          </a:stretch>
+        </p:blipFill>
+        <p:spPr>
+          <a:xfrm>
+            <a:off x="3581134" y="4421018"/>
+            <a:ext cx="5029731" cy="1427419"/>
+          </a:xfrm>
+          <a:prstGeom prst="rect">
+            <a:avLst/>
+          </a:prstGeom>
+        </p:spPr>
+      </p:pic>
+      <p:pic>
+        <p:nvPicPr>
+          <p:cNvPr id="9" name="Picture 8" descr="Graphical user interface, text, application&#10;&#10;Description automatically generated">
+            <a:extLst>
+              <a:ext uri="{FF2B5EF4-FFF2-40B4-BE49-F238E27FC236}">
+                <a16:creationId xmlns:a16="http://schemas.microsoft.com/office/drawing/2014/main" id="{0D7FE6A2-910D-B296-0113-15284AEAC574}"/>
+              </a:ext>
+            </a:extLst>
+          </p:cNvPr>
+          <p:cNvPicPr>
+            <a:picLocks noChangeAspect="1"/>
+          </p:cNvPicPr>
+          <p:nvPr/>
+        </p:nvPicPr>
+        <p:blipFill>
+          <a:blip r:embed="rId3"/>
+          <a:stretch>
+            <a:fillRect/>
+          </a:stretch>
+        </p:blipFill>
+        <p:spPr>
+          <a:xfrm>
+            <a:off x="6348250" y="2917281"/>
+            <a:ext cx="4744638" cy="1352156"/>
+          </a:xfrm>
+          <a:prstGeom prst="rect">
+            <a:avLst/>
+          </a:prstGeom>
+        </p:spPr>
+      </p:pic>
+      <p:pic>
+        <p:nvPicPr>
+          <p:cNvPr id="11" name="Picture 10" descr="Graphical user interface, text, application&#10;&#10;Description automatically generated">
+            <a:extLst>
+              <a:ext uri="{FF2B5EF4-FFF2-40B4-BE49-F238E27FC236}">
+                <a16:creationId xmlns:a16="http://schemas.microsoft.com/office/drawing/2014/main" id="{AFB6640F-C84F-24B3-0492-0C86589140D1}"/>
+              </a:ext>
+            </a:extLst>
+          </p:cNvPr>
+          <p:cNvPicPr>
+            <a:picLocks noChangeAspect="1"/>
+          </p:cNvPicPr>
+          <p:nvPr/>
+        </p:nvPicPr>
+        <p:blipFill>
+          <a:blip r:embed="rId4"/>
+          <a:stretch>
+            <a:fillRect/>
+          </a:stretch>
+        </p:blipFill>
+        <p:spPr>
+          <a:xfrm>
+            <a:off x="1099112" y="2917281"/>
+            <a:ext cx="5029731" cy="1361938"/>
+          </a:xfrm>
+          <a:prstGeom prst="rect">
+            <a:avLst/>
+          </a:prstGeom>
+        </p:spPr>
+      </p:pic>
+    </p:spTree>
+    <p:extLst>
+      <p:ext uri="{BB962C8B-B14F-4D97-AF65-F5344CB8AC3E}">
+        <p14:creationId xmlns:p14="http://schemas.microsoft.com/office/powerpoint/2010/main" val="1570421223"/>
+      </p:ext>
+    </p:extLst>
+  </p:cSld>
+  <p:clrMapOvr>
+    <a:masterClrMapping/>
+  </p:clrMapOvr>
+</p:sld>
+</file>
+
+<file path=ppt/slides/slide8.xml><?xml version="1.0" encoding="utf-8"?>
+<p:sld xmlns:a="http://schemas.openxmlformats.org/drawingml/2006/main" xmlns:r="http://schemas.openxmlformats.org/officeDocument/2006/relationships" xmlns:p="http://schemas.openxmlformats.org/presentationml/2006/main">
+  <p:cSld>
+    <p:spTree>
+      <p:nvGrpSpPr>
+        <p:cNvPr id="1" name=""/>
+        <p:cNvGrpSpPr/>
+        <p:nvPr/>
+      </p:nvGrpSpPr>
+      <p:grpSpPr>
+        <a:xfrm>
+          <a:off x="0" y="0"/>
+          <a:ext cx="0" cy="0"/>
+          <a:chOff x="0" y="0"/>
+          <a:chExt cx="0" cy="0"/>
+        </a:xfrm>
+      </p:grpSpPr>
+      <p:sp>
+        <p:nvSpPr>
           <p:cNvPr id="2" name="Title 1">
             <a:extLst>
               <a:ext uri="{FF2B5EF4-FFF2-40B4-BE49-F238E27FC236}">
@@ -13332,7 +13481,7 @@
 </p:sld>
 </file>
 
-<file path=ppt/slides/slide8.xml><?xml version="1.0" encoding="utf-8"?>
+<file path=ppt/slides/slide9.xml><?xml version="1.0" encoding="utf-8"?>
 <p:sld xmlns:a="http://schemas.openxmlformats.org/drawingml/2006/main" xmlns:r="http://schemas.openxmlformats.org/officeDocument/2006/relationships" xmlns:p="http://schemas.openxmlformats.org/presentationml/2006/main">
   <p:cSld>
     <p:spTree>

</xml_diff>